<commit_message>
Correct string with robot name in overview.png
</commit_message>
<xml_diff>
--- a/labs/lab3/figures/figures.pptx
+++ b/labs/lab3/figures/figures.pptx
@@ -271,7 +271,7 @@
           <a:p>
             <a:fld id="{1F5CB8FA-A5A7-45C3-86CC-341598224043}" type="datetimeFigureOut">
               <a:rPr lang="en-US" smtClean="0"/>
-              <a:t>4/5/2019</a:t>
+              <a:t>4/6/2019</a:t>
             </a:fld>
             <a:endParaRPr lang="en-US"/>
           </a:p>
@@ -469,7 +469,7 @@
           <a:p>
             <a:fld id="{1F5CB8FA-A5A7-45C3-86CC-341598224043}" type="datetimeFigureOut">
               <a:rPr lang="en-US" smtClean="0"/>
-              <a:t>4/5/2019</a:t>
+              <a:t>4/6/2019</a:t>
             </a:fld>
             <a:endParaRPr lang="en-US"/>
           </a:p>
@@ -677,7 +677,7 @@
           <a:p>
             <a:fld id="{1F5CB8FA-A5A7-45C3-86CC-341598224043}" type="datetimeFigureOut">
               <a:rPr lang="en-US" smtClean="0"/>
-              <a:t>4/5/2019</a:t>
+              <a:t>4/6/2019</a:t>
             </a:fld>
             <a:endParaRPr lang="en-US"/>
           </a:p>
@@ -875,7 +875,7 @@
           <a:p>
             <a:fld id="{1F5CB8FA-A5A7-45C3-86CC-341598224043}" type="datetimeFigureOut">
               <a:rPr lang="en-US" smtClean="0"/>
-              <a:t>4/5/2019</a:t>
+              <a:t>4/6/2019</a:t>
             </a:fld>
             <a:endParaRPr lang="en-US"/>
           </a:p>
@@ -1150,7 +1150,7 @@
           <a:p>
             <a:fld id="{1F5CB8FA-A5A7-45C3-86CC-341598224043}" type="datetimeFigureOut">
               <a:rPr lang="en-US" smtClean="0"/>
-              <a:t>4/5/2019</a:t>
+              <a:t>4/6/2019</a:t>
             </a:fld>
             <a:endParaRPr lang="en-US"/>
           </a:p>
@@ -1415,7 +1415,7 @@
           <a:p>
             <a:fld id="{1F5CB8FA-A5A7-45C3-86CC-341598224043}" type="datetimeFigureOut">
               <a:rPr lang="en-US" smtClean="0"/>
-              <a:t>4/5/2019</a:t>
+              <a:t>4/6/2019</a:t>
             </a:fld>
             <a:endParaRPr lang="en-US"/>
           </a:p>
@@ -1827,7 +1827,7 @@
           <a:p>
             <a:fld id="{1F5CB8FA-A5A7-45C3-86CC-341598224043}" type="datetimeFigureOut">
               <a:rPr lang="en-US" smtClean="0"/>
-              <a:t>4/5/2019</a:t>
+              <a:t>4/6/2019</a:t>
             </a:fld>
             <a:endParaRPr lang="en-US"/>
           </a:p>
@@ -1968,7 +1968,7 @@
           <a:p>
             <a:fld id="{1F5CB8FA-A5A7-45C3-86CC-341598224043}" type="datetimeFigureOut">
               <a:rPr lang="en-US" smtClean="0"/>
-              <a:t>4/5/2019</a:t>
+              <a:t>4/6/2019</a:t>
             </a:fld>
             <a:endParaRPr lang="en-US"/>
           </a:p>
@@ -2081,7 +2081,7 @@
           <a:p>
             <a:fld id="{1F5CB8FA-A5A7-45C3-86CC-341598224043}" type="datetimeFigureOut">
               <a:rPr lang="en-US" smtClean="0"/>
-              <a:t>4/5/2019</a:t>
+              <a:t>4/6/2019</a:t>
             </a:fld>
             <a:endParaRPr lang="en-US"/>
           </a:p>
@@ -2392,7 +2392,7 @@
           <a:p>
             <a:fld id="{1F5CB8FA-A5A7-45C3-86CC-341598224043}" type="datetimeFigureOut">
               <a:rPr lang="en-US" smtClean="0"/>
-              <a:t>4/5/2019</a:t>
+              <a:t>4/6/2019</a:t>
             </a:fld>
             <a:endParaRPr lang="en-US"/>
           </a:p>
@@ -2680,7 +2680,7 @@
           <a:p>
             <a:fld id="{1F5CB8FA-A5A7-45C3-86CC-341598224043}" type="datetimeFigureOut">
               <a:rPr lang="en-US" smtClean="0"/>
-              <a:t>4/5/2019</a:t>
+              <a:t>4/6/2019</a:t>
             </a:fld>
             <a:endParaRPr lang="en-US"/>
           </a:p>
@@ -2921,7 +2921,7 @@
           <a:p>
             <a:fld id="{1F5CB8FA-A5A7-45C3-86CC-341598224043}" type="datetimeFigureOut">
               <a:rPr lang="en-US" smtClean="0"/>
-              <a:t>4/5/2019</a:t>
+              <a:t>4/6/2019</a:t>
             </a:fld>
             <a:endParaRPr lang="en-US"/>
           </a:p>
@@ -4579,7 +4579,7 @@
         <p:spPr>
           <a:xfrm>
             <a:off x="7354902" y="4421656"/>
-            <a:ext cx="4108817" cy="307777"/>
+            <a:ext cx="4067139" cy="307777"/>
           </a:xfrm>
           <a:prstGeom prst="rect">
             <a:avLst/>
@@ -4603,7 +4603,7 @@
                 <a:latin typeface="Arial" panose="020B0604020202020204" pitchFamily="34" charset="0"/>
                 <a:cs typeface="Arial" panose="020B0604020202020204" pitchFamily="34" charset="0"/>
               </a:rPr>
-              <a:t>se.lth.cs.etsa02.BasicMeleeBot.BasicMeleeBot*”</a:t>
+              <a:t>se.lth.cs.etsa02.basicmeleebot.BasicMeleeBot*”</a:t>
             </a:r>
           </a:p>
         </p:txBody>

</xml_diff>